<commit_message>
seminario: add notas de tipo de data sets utilizados
</commit_message>
<xml_diff>
--- a/Seminario/Optimal Clusters Final.pptx
+++ b/Seminario/Optimal Clusters Final.pptx
@@ -223,7 +223,7 @@
           <a:p>
             <a:fld id="{77F42454-F8E5-4448-9889-8156D3A2DC09}" type="datetimeFigureOut">
               <a:rPr lang="pt-BR" smtClean="0"/>
-              <a:t>29/05/2024</a:t>
+              <a:t>30/05/2024</a:t>
             </a:fld>
             <a:endParaRPr lang="pt-BR"/>
           </a:p>
@@ -381,7 +381,7 @@
           <a:p>
             <a:fld id="{1F8D2AEA-1C3E-4820-8402-A7907DA2F37E}" type="slidenum">
               <a:rPr lang="pt-BR" smtClean="0"/>
-              <a:t>‹nº›</a:t>
+              <a:t>‹#›</a:t>
             </a:fld>
             <a:endParaRPr lang="pt-BR"/>
           </a:p>
@@ -1443,25 +1443,238 @@
           <a:lstStyle/>
           <a:p>
             <a:r>
-              <a:rPr lang="pt-BR" dirty="0"/>
-              <a:t>Os procedimentos </a:t>
-            </a:r>
-            <a:r>
-              <a:rPr lang="pt-BR" dirty="0" err="1"/>
-              <a:t>aglomerativos</a:t>
-            </a:r>
-            <a:r>
-              <a:rPr lang="pt-BR" dirty="0"/>
-              <a:t> começam com n clusters </a:t>
-            </a:r>
-            <a:r>
-              <a:rPr lang="pt-BR" dirty="0" err="1"/>
-              <a:t>singleton</a:t>
-            </a:r>
-            <a:r>
-              <a:rPr lang="pt-BR" dirty="0"/>
-              <a:t> e, em seguida, formam uma sequência mesclando clusters sucessivamente</a:t>
-            </a:r>
+              <a:rPr lang="pt-BR" b="1" dirty="0"/>
+              <a:t>Linear</a:t>
+            </a:r>
+          </a:p>
+          <a:p>
+            <a:pPr marL="171450" indent="-171450">
+              <a:buFont typeface="Arial" panose="020B0604020202020204" pitchFamily="34" charset="0"/>
+              <a:buChar char="•"/>
+            </a:pPr>
+            <a:r>
+              <a:rPr lang="pt-BR" dirty="0"/>
+              <a:t>Parallel2</a:t>
+            </a:r>
+          </a:p>
+          <a:p>
+            <a:pPr marL="171450" indent="-171450">
+              <a:buFont typeface="Arial" panose="020B0604020202020204" pitchFamily="34" charset="0"/>
+              <a:buChar char="•"/>
+            </a:pPr>
+            <a:r>
+              <a:rPr lang="pt-BR" dirty="0"/>
+              <a:t>Parallel4</a:t>
+            </a:r>
+          </a:p>
+          <a:p>
+            <a:pPr marL="171450" indent="-171450">
+              <a:buFont typeface="Arial" panose="020B0604020202020204" pitchFamily="34" charset="0"/>
+              <a:buChar char="•"/>
+            </a:pPr>
+            <a:r>
+              <a:rPr lang="pt-BR" dirty="0"/>
+              <a:t>Parallel6</a:t>
+            </a:r>
+          </a:p>
+          <a:p>
+            <a:pPr marL="171450" indent="-171450">
+              <a:buFont typeface="Arial" panose="020B0604020202020204" pitchFamily="34" charset="0"/>
+              <a:buChar char="•"/>
+            </a:pPr>
+            <a:r>
+              <a:rPr lang="pt-BR" dirty="0"/>
+              <a:t>Cross2</a:t>
+            </a:r>
+          </a:p>
+          <a:p>
+            <a:pPr marL="171450" indent="-171450">
+              <a:buFont typeface="Arial" panose="020B0604020202020204" pitchFamily="34" charset="0"/>
+              <a:buChar char="•"/>
+            </a:pPr>
+            <a:r>
+              <a:rPr lang="pt-BR" dirty="0"/>
+              <a:t>Cross3</a:t>
+            </a:r>
+          </a:p>
+          <a:p>
+            <a:pPr marL="171450" indent="-171450">
+              <a:buFont typeface="Arial" panose="020B0604020202020204" pitchFamily="34" charset="0"/>
+              <a:buChar char="•"/>
+            </a:pPr>
+            <a:r>
+              <a:rPr lang="pt-BR" dirty="0"/>
+              <a:t>Cross5</a:t>
+            </a:r>
+          </a:p>
+          <a:p>
+            <a:pPr marL="171450" indent="-171450">
+              <a:buFont typeface="Arial" panose="020B0604020202020204" pitchFamily="34" charset="0"/>
+              <a:buChar char="•"/>
+            </a:pPr>
+            <a:r>
+              <a:rPr lang="pt-BR" dirty="0"/>
+              <a:t>Segment6</a:t>
+            </a:r>
+          </a:p>
+          <a:p>
+            <a:endParaRPr lang="pt-BR" dirty="0"/>
+          </a:p>
+          <a:p>
+            <a:r>
+              <a:rPr lang="pt-BR" b="1" dirty="0" err="1"/>
+              <a:t>Manifold</a:t>
+            </a:r>
+            <a:endParaRPr lang="pt-BR" b="1" dirty="0"/>
+          </a:p>
+          <a:p>
+            <a:pPr marL="171450" indent="-171450">
+              <a:buFont typeface="Arial" panose="020B0604020202020204" pitchFamily="34" charset="0"/>
+              <a:buChar char="•"/>
+            </a:pPr>
+            <a:r>
+              <a:rPr lang="pt-BR" b="0" dirty="0"/>
+              <a:t>Semicircle2</a:t>
+            </a:r>
+          </a:p>
+          <a:p>
+            <a:pPr marL="171450" indent="-171450">
+              <a:buFont typeface="Arial" panose="020B0604020202020204" pitchFamily="34" charset="0"/>
+              <a:buChar char="•"/>
+            </a:pPr>
+            <a:r>
+              <a:rPr lang="pt-BR" b="0" dirty="0"/>
+              <a:t>Semicircle3</a:t>
+            </a:r>
+          </a:p>
+          <a:p>
+            <a:pPr marL="171450" indent="-171450">
+              <a:buFont typeface="Arial" panose="020B0604020202020204" pitchFamily="34" charset="0"/>
+              <a:buChar char="•"/>
+            </a:pPr>
+            <a:r>
+              <a:rPr lang="pt-BR" b="0" dirty="0"/>
+              <a:t>Semicircle4</a:t>
+            </a:r>
+          </a:p>
+          <a:p>
+            <a:pPr marL="171450" indent="-171450">
+              <a:buFont typeface="Arial" panose="020B0604020202020204" pitchFamily="34" charset="0"/>
+              <a:buChar char="•"/>
+            </a:pPr>
+            <a:r>
+              <a:rPr lang="pt-BR" b="0" dirty="0"/>
+              <a:t>Spiral2</a:t>
+            </a:r>
+          </a:p>
+          <a:p>
+            <a:endParaRPr lang="pt-BR" b="1" dirty="0"/>
+          </a:p>
+          <a:p>
+            <a:r>
+              <a:rPr lang="pt-BR" b="1" dirty="0" err="1"/>
+              <a:t>Annular</a:t>
+            </a:r>
+            <a:endParaRPr lang="pt-BR" sz="1200" b="1" dirty="0">
+              <a:effectLst/>
+              <a:latin typeface="+mn-lt"/>
+            </a:endParaRPr>
+          </a:p>
+          <a:p>
+            <a:pPr marL="171450" marR="0" lvl="0" indent="-171450" algn="l" defTabSz="914400" rtl="0" eaLnBrk="1" fontAlgn="auto" latinLnBrk="0" hangingPunct="1">
+              <a:lnSpc>
+                <a:spcPct val="100000"/>
+              </a:lnSpc>
+              <a:spcBef>
+                <a:spcPts val="0"/>
+              </a:spcBef>
+              <a:spcAft>
+                <a:spcPts val="0"/>
+              </a:spcAft>
+              <a:buClrTx/>
+              <a:buSzTx/>
+              <a:buFont typeface="Arial" panose="020B0604020202020204" pitchFamily="34" charset="0"/>
+              <a:buChar char="•"/>
+              <a:tabLst/>
+              <a:defRPr/>
+            </a:pPr>
+            <a:r>
+              <a:rPr lang="pt-BR" b="0" dirty="0"/>
+              <a:t>Circle2</a:t>
+            </a:r>
+          </a:p>
+          <a:p>
+            <a:pPr marL="171450" indent="-171450">
+              <a:buFont typeface="Arial" panose="020B0604020202020204" pitchFamily="34" charset="0"/>
+              <a:buChar char="•"/>
+            </a:pPr>
+            <a:r>
+              <a:rPr lang="pt-BR" b="0" dirty="0"/>
+              <a:t>Circle3</a:t>
+            </a:r>
+          </a:p>
+          <a:p>
+            <a:pPr marL="171450" indent="-171450">
+              <a:buFont typeface="Arial" panose="020B0604020202020204" pitchFamily="34" charset="0"/>
+              <a:buChar char="•"/>
+            </a:pPr>
+            <a:r>
+              <a:rPr lang="pt-BR" b="0" dirty="0"/>
+              <a:t>Circle4</a:t>
+            </a:r>
+          </a:p>
+          <a:p>
+            <a:pPr marL="171450" indent="-171450">
+              <a:buFont typeface="Arial" panose="020B0604020202020204" pitchFamily="34" charset="0"/>
+              <a:buChar char="•"/>
+            </a:pPr>
+            <a:r>
+              <a:rPr lang="pt-BR" b="0" dirty="0"/>
+              <a:t>Circle5</a:t>
+            </a:r>
+          </a:p>
+          <a:p>
+            <a:pPr marL="171450" indent="-171450">
+              <a:buFont typeface="Arial" panose="020B0604020202020204" pitchFamily="34" charset="0"/>
+              <a:buChar char="•"/>
+            </a:pPr>
+            <a:r>
+              <a:rPr lang="pt-BR" b="0" dirty="0"/>
+              <a:t>Ring2</a:t>
+            </a:r>
+          </a:p>
+          <a:p>
+            <a:endParaRPr lang="pt-BR" b="1" dirty="0"/>
+          </a:p>
+          <a:p>
+            <a:r>
+              <a:rPr lang="pt-BR" b="1" dirty="0" err="1"/>
+              <a:t>Convex</a:t>
+            </a:r>
+            <a:endParaRPr lang="pt-BR" b="1" dirty="0"/>
+          </a:p>
+          <a:p>
+            <a:pPr marL="171450" indent="-171450">
+              <a:buFont typeface="Arial" panose="020B0604020202020204" pitchFamily="34" charset="0"/>
+              <a:buChar char="•"/>
+            </a:pPr>
+            <a:r>
+              <a:rPr lang="pt-BR" b="0" dirty="0"/>
+              <a:t>Norm3</a:t>
+            </a:r>
+          </a:p>
+          <a:p>
+            <a:pPr marL="171450" indent="-171450">
+              <a:buFont typeface="Arial" panose="020B0604020202020204" pitchFamily="34" charset="0"/>
+              <a:buChar char="•"/>
+            </a:pPr>
+            <a:r>
+              <a:rPr lang="pt-BR" b="0" dirty="0"/>
+              <a:t>Norm4</a:t>
+            </a:r>
+          </a:p>
+          <a:p>
+            <a:endParaRPr lang="pt-BR" b="1" dirty="0"/>
           </a:p>
         </p:txBody>
       </p:sp>
@@ -3210,7 +3423,7 @@
           <a:p>
             <a:fld id="{8C15FD2E-C8FA-413F-967B-D393CA7492D4}" type="datetimeFigureOut">
               <a:rPr lang="pt-BR" smtClean="0"/>
-              <a:t>29/05/2024</a:t>
+              <a:t>30/05/2024</a:t>
             </a:fld>
             <a:endParaRPr lang="pt-BR"/>
           </a:p>
@@ -3264,7 +3477,7 @@
           <a:p>
             <a:fld id="{8EEE9821-7E4D-4B80-9764-0C53DD4E4703}" type="slidenum">
               <a:rPr lang="pt-BR" smtClean="0"/>
-              <a:t>‹nº›</a:t>
+              <a:t>‹#›</a:t>
             </a:fld>
             <a:endParaRPr lang="pt-BR"/>
           </a:p>
@@ -3408,7 +3621,7 @@
           <a:p>
             <a:fld id="{8C15FD2E-C8FA-413F-967B-D393CA7492D4}" type="datetimeFigureOut">
               <a:rPr lang="pt-BR" smtClean="0"/>
-              <a:t>29/05/2024</a:t>
+              <a:t>30/05/2024</a:t>
             </a:fld>
             <a:endParaRPr lang="pt-BR"/>
           </a:p>
@@ -3462,7 +3675,7 @@
           <a:p>
             <a:fld id="{8EEE9821-7E4D-4B80-9764-0C53DD4E4703}" type="slidenum">
               <a:rPr lang="pt-BR" smtClean="0"/>
-              <a:t>‹nº›</a:t>
+              <a:t>‹#›</a:t>
             </a:fld>
             <a:endParaRPr lang="pt-BR"/>
           </a:p>
@@ -3616,7 +3829,7 @@
           <a:p>
             <a:fld id="{8C15FD2E-C8FA-413F-967B-D393CA7492D4}" type="datetimeFigureOut">
               <a:rPr lang="pt-BR" smtClean="0"/>
-              <a:t>29/05/2024</a:t>
+              <a:t>30/05/2024</a:t>
             </a:fld>
             <a:endParaRPr lang="pt-BR"/>
           </a:p>
@@ -3670,7 +3883,7 @@
           <a:p>
             <a:fld id="{8EEE9821-7E4D-4B80-9764-0C53DD4E4703}" type="slidenum">
               <a:rPr lang="pt-BR" smtClean="0"/>
-              <a:t>‹nº›</a:t>
+              <a:t>‹#›</a:t>
             </a:fld>
             <a:endParaRPr lang="pt-BR"/>
           </a:p>
@@ -3814,7 +4027,7 @@
           <a:p>
             <a:fld id="{8C15FD2E-C8FA-413F-967B-D393CA7492D4}" type="datetimeFigureOut">
               <a:rPr lang="pt-BR" smtClean="0"/>
-              <a:t>29/05/2024</a:t>
+              <a:t>30/05/2024</a:t>
             </a:fld>
             <a:endParaRPr lang="pt-BR"/>
           </a:p>
@@ -3868,7 +4081,7 @@
           <a:p>
             <a:fld id="{8EEE9821-7E4D-4B80-9764-0C53DD4E4703}" type="slidenum">
               <a:rPr lang="pt-BR" smtClean="0"/>
-              <a:t>‹nº›</a:t>
+              <a:t>‹#›</a:t>
             </a:fld>
             <a:endParaRPr lang="pt-BR"/>
           </a:p>
@@ -4089,7 +4302,7 @@
           <a:p>
             <a:fld id="{8C15FD2E-C8FA-413F-967B-D393CA7492D4}" type="datetimeFigureOut">
               <a:rPr lang="pt-BR" smtClean="0"/>
-              <a:t>29/05/2024</a:t>
+              <a:t>30/05/2024</a:t>
             </a:fld>
             <a:endParaRPr lang="pt-BR"/>
           </a:p>
@@ -4143,7 +4356,7 @@
           <a:p>
             <a:fld id="{8EEE9821-7E4D-4B80-9764-0C53DD4E4703}" type="slidenum">
               <a:rPr lang="pt-BR" smtClean="0"/>
-              <a:t>‹nº›</a:t>
+              <a:t>‹#›</a:t>
             </a:fld>
             <a:endParaRPr lang="pt-BR"/>
           </a:p>
@@ -4354,7 +4567,7 @@
           <a:p>
             <a:fld id="{8C15FD2E-C8FA-413F-967B-D393CA7492D4}" type="datetimeFigureOut">
               <a:rPr lang="pt-BR" smtClean="0"/>
-              <a:t>29/05/2024</a:t>
+              <a:t>30/05/2024</a:t>
             </a:fld>
             <a:endParaRPr lang="pt-BR"/>
           </a:p>
@@ -4408,7 +4621,7 @@
           <a:p>
             <a:fld id="{8EEE9821-7E4D-4B80-9764-0C53DD4E4703}" type="slidenum">
               <a:rPr lang="pt-BR" smtClean="0"/>
-              <a:t>‹nº›</a:t>
+              <a:t>‹#›</a:t>
             </a:fld>
             <a:endParaRPr lang="pt-BR"/>
           </a:p>
@@ -4766,7 +4979,7 @@
           <a:p>
             <a:fld id="{8C15FD2E-C8FA-413F-967B-D393CA7492D4}" type="datetimeFigureOut">
               <a:rPr lang="pt-BR" smtClean="0"/>
-              <a:t>29/05/2024</a:t>
+              <a:t>30/05/2024</a:t>
             </a:fld>
             <a:endParaRPr lang="pt-BR"/>
           </a:p>
@@ -4820,7 +5033,7 @@
           <a:p>
             <a:fld id="{8EEE9821-7E4D-4B80-9764-0C53DD4E4703}" type="slidenum">
               <a:rPr lang="pt-BR" smtClean="0"/>
-              <a:t>‹nº›</a:t>
+              <a:t>‹#›</a:t>
             </a:fld>
             <a:endParaRPr lang="pt-BR"/>
           </a:p>
@@ -4907,7 +5120,7 @@
           <a:p>
             <a:fld id="{8C15FD2E-C8FA-413F-967B-D393CA7492D4}" type="datetimeFigureOut">
               <a:rPr lang="pt-BR" smtClean="0"/>
-              <a:t>29/05/2024</a:t>
+              <a:t>30/05/2024</a:t>
             </a:fld>
             <a:endParaRPr lang="pt-BR"/>
           </a:p>
@@ -4961,7 +5174,7 @@
           <a:p>
             <a:fld id="{8EEE9821-7E4D-4B80-9764-0C53DD4E4703}" type="slidenum">
               <a:rPr lang="pt-BR" smtClean="0"/>
-              <a:t>‹nº›</a:t>
+              <a:t>‹#›</a:t>
             </a:fld>
             <a:endParaRPr lang="pt-BR"/>
           </a:p>
@@ -5020,7 +5233,7 @@
           <a:p>
             <a:fld id="{8C15FD2E-C8FA-413F-967B-D393CA7492D4}" type="datetimeFigureOut">
               <a:rPr lang="pt-BR" smtClean="0"/>
-              <a:t>29/05/2024</a:t>
+              <a:t>30/05/2024</a:t>
             </a:fld>
             <a:endParaRPr lang="pt-BR"/>
           </a:p>
@@ -5074,7 +5287,7 @@
           <a:p>
             <a:fld id="{8EEE9821-7E4D-4B80-9764-0C53DD4E4703}" type="slidenum">
               <a:rPr lang="pt-BR" smtClean="0"/>
-              <a:t>‹nº›</a:t>
+              <a:t>‹#›</a:t>
             </a:fld>
             <a:endParaRPr lang="pt-BR"/>
           </a:p>
@@ -5331,7 +5544,7 @@
           <a:p>
             <a:fld id="{8C15FD2E-C8FA-413F-967B-D393CA7492D4}" type="datetimeFigureOut">
               <a:rPr lang="pt-BR" smtClean="0"/>
-              <a:t>29/05/2024</a:t>
+              <a:t>30/05/2024</a:t>
             </a:fld>
             <a:endParaRPr lang="pt-BR"/>
           </a:p>
@@ -5385,7 +5598,7 @@
           <a:p>
             <a:fld id="{8EEE9821-7E4D-4B80-9764-0C53DD4E4703}" type="slidenum">
               <a:rPr lang="pt-BR" smtClean="0"/>
-              <a:t>‹nº›</a:t>
+              <a:t>‹#›</a:t>
             </a:fld>
             <a:endParaRPr lang="pt-BR"/>
           </a:p>
@@ -5619,7 +5832,7 @@
           <a:p>
             <a:fld id="{8C15FD2E-C8FA-413F-967B-D393CA7492D4}" type="datetimeFigureOut">
               <a:rPr lang="pt-BR" smtClean="0"/>
-              <a:t>29/05/2024</a:t>
+              <a:t>30/05/2024</a:t>
             </a:fld>
             <a:endParaRPr lang="pt-BR"/>
           </a:p>
@@ -5673,7 +5886,7 @@
           <a:p>
             <a:fld id="{8EEE9821-7E4D-4B80-9764-0C53DD4E4703}" type="slidenum">
               <a:rPr lang="pt-BR" smtClean="0"/>
-              <a:t>‹nº›</a:t>
+              <a:t>‹#›</a:t>
             </a:fld>
             <a:endParaRPr lang="pt-BR"/>
           </a:p>
@@ -5860,7 +6073,7 @@
           <a:p>
             <a:fld id="{8C15FD2E-C8FA-413F-967B-D393CA7492D4}" type="datetimeFigureOut">
               <a:rPr lang="pt-BR" smtClean="0"/>
-              <a:t>29/05/2024</a:t>
+              <a:t>30/05/2024</a:t>
             </a:fld>
             <a:endParaRPr lang="pt-BR"/>
           </a:p>
@@ -5950,7 +6163,7 @@
           <a:p>
             <a:fld id="{8EEE9821-7E4D-4B80-9764-0C53DD4E4703}" type="slidenum">
               <a:rPr lang="pt-BR" smtClean="0"/>
-              <a:t>‹nº›</a:t>
+              <a:t>‹#›</a:t>
             </a:fld>
             <a:endParaRPr lang="pt-BR"/>
           </a:p>

</xml_diff>

<commit_message>
seminario: add algumas notas nos slides de resultados
</commit_message>
<xml_diff>
--- a/Seminario/Optimal Clusters Final.pptx
+++ b/Seminario/Optimal Clusters Final.pptx
@@ -1341,24 +1341,13 @@
           <a:p>
             <a:r>
               <a:rPr lang="pt-BR" dirty="0"/>
-              <a:t>Os procedimentos </a:t>
-            </a:r>
-            <a:r>
-              <a:rPr lang="pt-BR" dirty="0" err="1"/>
-              <a:t>aglomerativos</a:t>
-            </a:r>
-            <a:r>
-              <a:rPr lang="pt-BR" dirty="0"/>
-              <a:t> começam com n clusters </a:t>
-            </a:r>
-            <a:r>
-              <a:rPr lang="pt-BR" dirty="0" err="1"/>
-              <a:t>singleton</a:t>
-            </a:r>
-            <a:r>
-              <a:rPr lang="pt-BR" dirty="0"/>
-              <a:t> e, em seguida, formam uma sequência mesclando clusters sucessivamente</a:t>
-            </a:r>
+              <a:t>18 data sets sintéticos e 3 data </a:t>
+            </a:r>
+            <a:r>
+              <a:rPr lang="pt-BR"/>
+              <a:t>sets reais</a:t>
+            </a:r>
+            <a:endParaRPr lang="pt-BR" dirty="0"/>
           </a:p>
         </p:txBody>
       </p:sp>
@@ -1758,26 +1747,369 @@
           <a:bodyPr/>
           <a:lstStyle/>
           <a:p>
-            <a:r>
-              <a:rPr lang="pt-BR" dirty="0"/>
-              <a:t>Os procedimentos </a:t>
-            </a:r>
-            <a:r>
-              <a:rPr lang="pt-BR" dirty="0" err="1"/>
-              <a:t>aglomerativos</a:t>
-            </a:r>
-            <a:r>
-              <a:rPr lang="pt-BR" dirty="0"/>
-              <a:t> começam com n clusters </a:t>
-            </a:r>
-            <a:r>
-              <a:rPr lang="pt-BR" dirty="0" err="1"/>
-              <a:t>singleton</a:t>
-            </a:r>
-            <a:r>
-              <a:rPr lang="pt-BR" dirty="0"/>
-              <a:t> e, em seguida, formam uma sequência mesclando clusters sucessivamente</a:t>
-            </a:r>
+            <a:pPr marL="0" marR="0" lvl="0" indent="0" algn="l" defTabSz="914400" rtl="0" eaLnBrk="1" fontAlgn="auto" latinLnBrk="0" hangingPunct="1">
+              <a:lnSpc>
+                <a:spcPct val="100000"/>
+              </a:lnSpc>
+              <a:spcBef>
+                <a:spcPts val="0"/>
+              </a:spcBef>
+              <a:spcAft>
+                <a:spcPts val="0"/>
+              </a:spcAft>
+              <a:buClrTx/>
+              <a:buSzTx/>
+              <a:buFontTx/>
+              <a:buNone/>
+              <a:tabLst/>
+              <a:defRPr/>
+            </a:pPr>
+            <a:r>
+              <a:rPr lang="en-US" sz="1800" b="1" dirty="0" err="1">
+                <a:effectLst/>
+                <a:latin typeface="Times"/>
+              </a:rPr>
+              <a:t>Calinski</a:t>
+            </a:r>
+            <a:r>
+              <a:rPr lang="en-US" sz="1800" b="1" dirty="0">
+                <a:effectLst/>
+                <a:latin typeface="Times"/>
+              </a:rPr>
+              <a:t>–</a:t>
+            </a:r>
+            <a:r>
+              <a:rPr lang="en-US" sz="1800" b="1" dirty="0" err="1">
+                <a:effectLst/>
+                <a:latin typeface="Times"/>
+              </a:rPr>
+              <a:t>Harabasz</a:t>
+            </a:r>
+            <a:r>
+              <a:rPr lang="en-US" sz="1800" b="1" dirty="0">
+                <a:effectLst/>
+                <a:latin typeface="Times"/>
+              </a:rPr>
+              <a:t> (</a:t>
+            </a:r>
+            <a:r>
+              <a:rPr lang="pt-BR" b="1" dirty="0"/>
+              <a:t>CH) Index</a:t>
+            </a:r>
+          </a:p>
+          <a:p>
+            <a:endParaRPr lang="pt-BR" dirty="0"/>
+          </a:p>
+          <a:p>
+            <a:r>
+              <a:rPr lang="pt-BR" b="1" dirty="0"/>
+              <a:t>Davies-</a:t>
+            </a:r>
+            <a:r>
+              <a:rPr lang="pt-BR" b="1" dirty="0" err="1"/>
+              <a:t>Bouldin</a:t>
+            </a:r>
+            <a:r>
+              <a:rPr lang="pt-BR" b="1" dirty="0"/>
+              <a:t> (DB) index</a:t>
+            </a:r>
+          </a:p>
+          <a:p>
+            <a:endParaRPr lang="pt-BR" dirty="0"/>
+          </a:p>
+          <a:p>
+            <a:r>
+              <a:rPr lang="pt-BR" b="1" dirty="0" err="1"/>
+              <a:t>Silhouette</a:t>
+            </a:r>
+            <a:r>
+              <a:rPr lang="pt-BR" b="1" dirty="0"/>
+              <a:t> (</a:t>
+            </a:r>
+            <a:r>
+              <a:rPr lang="pt-BR" b="1" dirty="0" err="1"/>
+              <a:t>Sil</a:t>
+            </a:r>
+            <a:r>
+              <a:rPr lang="pt-BR" b="1" dirty="0"/>
+              <a:t>) index</a:t>
+            </a:r>
+          </a:p>
+          <a:p>
+            <a:pPr marL="0" marR="0" lvl="0" indent="0" algn="l" defTabSz="914400" rtl="0" eaLnBrk="1" fontAlgn="auto" latinLnBrk="0" hangingPunct="1">
+              <a:lnSpc>
+                <a:spcPct val="100000"/>
+              </a:lnSpc>
+              <a:spcBef>
+                <a:spcPts val="0"/>
+              </a:spcBef>
+              <a:spcAft>
+                <a:spcPts val="0"/>
+              </a:spcAft>
+              <a:buClrTx/>
+              <a:buSzTx/>
+              <a:buFontTx/>
+              <a:buNone/>
+              <a:tabLst/>
+              <a:defRPr/>
+            </a:pPr>
+            <a:r>
+              <a:rPr lang="en-US" dirty="0"/>
+              <a:t>O </a:t>
+            </a:r>
+            <a:r>
+              <a:rPr lang="en-US" dirty="0" err="1"/>
+              <a:t>índice</a:t>
+            </a:r>
+            <a:r>
+              <a:rPr lang="en-US" dirty="0"/>
+              <a:t> Sil </a:t>
+            </a:r>
+            <a:r>
+              <a:rPr lang="en-US" dirty="0" err="1"/>
+              <a:t>apresenta</a:t>
+            </a:r>
+            <a:r>
+              <a:rPr lang="en-US" dirty="0"/>
+              <a:t> a </a:t>
+            </a:r>
+            <a:r>
+              <a:rPr lang="en-US" dirty="0" err="1"/>
+              <a:t>validade</a:t>
+            </a:r>
+            <a:r>
+              <a:rPr lang="en-US" dirty="0"/>
+              <a:t> de </a:t>
+            </a:r>
+            <a:r>
+              <a:rPr lang="en-US" dirty="0" err="1"/>
+              <a:t>agrupamento</a:t>
+            </a:r>
+            <a:r>
+              <a:rPr lang="en-US" dirty="0"/>
+              <a:t> de </a:t>
+            </a:r>
+            <a:r>
+              <a:rPr lang="en-US" dirty="0" err="1"/>
+              <a:t>uma</a:t>
+            </a:r>
+            <a:r>
+              <a:rPr lang="en-US" dirty="0"/>
+              <a:t> </a:t>
+            </a:r>
+            <a:r>
+              <a:rPr lang="en-US" dirty="0" err="1"/>
+              <a:t>única</a:t>
+            </a:r>
+            <a:r>
+              <a:rPr lang="en-US" dirty="0"/>
+              <a:t> </a:t>
+            </a:r>
+            <a:r>
+              <a:rPr lang="en-US" dirty="0" err="1"/>
+              <a:t>amostra</a:t>
+            </a:r>
+            <a:r>
+              <a:rPr lang="en-US" dirty="0"/>
+              <a:t>, o que </a:t>
+            </a:r>
+            <a:r>
+              <a:rPr lang="en-US" dirty="0" err="1"/>
+              <a:t>pode</a:t>
+            </a:r>
+            <a:r>
+              <a:rPr lang="en-US" dirty="0"/>
+              <a:t> </a:t>
+            </a:r>
+            <a:r>
+              <a:rPr lang="en-US" dirty="0" err="1"/>
+              <a:t>negligenciar</a:t>
+            </a:r>
+            <a:r>
+              <a:rPr lang="en-US" dirty="0"/>
+              <a:t> a </a:t>
+            </a:r>
+            <a:r>
+              <a:rPr lang="en-US" dirty="0" err="1"/>
+              <a:t>característica</a:t>
+            </a:r>
+            <a:r>
+              <a:rPr lang="en-US" dirty="0"/>
+              <a:t> </a:t>
+            </a:r>
+            <a:r>
+              <a:rPr lang="en-US" dirty="0" err="1"/>
+              <a:t>comum</a:t>
+            </a:r>
+            <a:r>
+              <a:rPr lang="en-US" dirty="0"/>
+              <a:t> de </a:t>
+            </a:r>
+            <a:r>
+              <a:rPr lang="en-US" dirty="0" err="1"/>
+              <a:t>todas</a:t>
+            </a:r>
+            <a:r>
+              <a:rPr lang="en-US" dirty="0"/>
+              <a:t> as </a:t>
+            </a:r>
+            <a:r>
+              <a:rPr lang="en-US" dirty="0" err="1"/>
+              <a:t>amostras</a:t>
+            </a:r>
+            <a:r>
+              <a:rPr lang="en-US" dirty="0"/>
+              <a:t> de </a:t>
+            </a:r>
+            <a:r>
+              <a:rPr lang="en-US" dirty="0" err="1"/>
+              <a:t>cada</a:t>
+            </a:r>
+            <a:r>
+              <a:rPr lang="en-US" dirty="0"/>
+              <a:t> </a:t>
+            </a:r>
+            <a:r>
+              <a:rPr lang="en-US" dirty="0" err="1"/>
+              <a:t>agrupamento</a:t>
+            </a:r>
+            <a:r>
+              <a:rPr lang="en-US" dirty="0"/>
+              <a:t>.</a:t>
+            </a:r>
+          </a:p>
+          <a:p>
+            <a:endParaRPr lang="pt-BR" b="1" dirty="0"/>
+          </a:p>
+          <a:p>
+            <a:r>
+              <a:rPr lang="en-US" sz="1800" b="1" dirty="0" err="1">
+                <a:effectLst/>
+                <a:latin typeface="Times"/>
+              </a:rPr>
+              <a:t>Krzanowski</a:t>
+            </a:r>
+            <a:r>
+              <a:rPr lang="en-US" sz="1800" b="1" dirty="0">
+                <a:effectLst/>
+                <a:latin typeface="Times"/>
+              </a:rPr>
+              <a:t>–Lai (KL) </a:t>
+            </a:r>
+            <a:endParaRPr lang="en-US" b="1" dirty="0"/>
+          </a:p>
+          <a:p>
+            <a:endParaRPr lang="pt-BR" dirty="0"/>
+          </a:p>
+          <a:p>
+            <a:r>
+              <a:rPr lang="en-US" sz="1800" b="1" dirty="0">
+                <a:effectLst/>
+                <a:latin typeface="Times"/>
+              </a:rPr>
+              <a:t>Weighted inter–intra (</a:t>
+            </a:r>
+            <a:r>
+              <a:rPr lang="en-US" sz="1800" b="1" dirty="0" err="1">
+                <a:effectLst/>
+                <a:latin typeface="Times"/>
+              </a:rPr>
+              <a:t>Wint</a:t>
+            </a:r>
+            <a:r>
+              <a:rPr lang="en-US" sz="1800" b="1" dirty="0">
+                <a:effectLst/>
+                <a:latin typeface="Times"/>
+              </a:rPr>
+              <a:t>) </a:t>
+            </a:r>
+            <a:endParaRPr lang="en-US" b="1" dirty="0"/>
+          </a:p>
+          <a:p>
+            <a:endParaRPr lang="pt-BR" dirty="0"/>
+          </a:p>
+          <a:p>
+            <a:pPr marL="0" marR="0" lvl="0" indent="0" algn="l" defTabSz="914400" rtl="0" eaLnBrk="1" fontAlgn="auto" latinLnBrk="0" hangingPunct="1">
+              <a:lnSpc>
+                <a:spcPct val="100000"/>
+              </a:lnSpc>
+              <a:spcBef>
+                <a:spcPts val="0"/>
+              </a:spcBef>
+              <a:spcAft>
+                <a:spcPts val="0"/>
+              </a:spcAft>
+              <a:buClrTx/>
+              <a:buSzTx/>
+              <a:buFontTx/>
+              <a:buNone/>
+              <a:tabLst/>
+              <a:defRPr/>
+            </a:pPr>
+            <a:r>
+              <a:rPr lang="en-US" sz="1800" b="1" i="1" dirty="0">
+                <a:effectLst/>
+                <a:latin typeface="Times"/>
+              </a:rPr>
+              <a:t>V</a:t>
+            </a:r>
+            <a:r>
+              <a:rPr lang="el-GR" sz="1800" b="1" dirty="0">
+                <a:effectLst/>
+                <a:latin typeface="RBLMI"/>
+              </a:rPr>
+              <a:t>λ </a:t>
+            </a:r>
+            <a:endParaRPr lang="pt-BR" sz="1800" b="1" dirty="0">
+              <a:effectLst/>
+              <a:latin typeface="RBLMI"/>
+            </a:endParaRPr>
+          </a:p>
+          <a:p>
+            <a:pPr marL="0" marR="0" lvl="0" indent="0" algn="l" defTabSz="914400" rtl="0" eaLnBrk="1" fontAlgn="auto" latinLnBrk="0" hangingPunct="1">
+              <a:lnSpc>
+                <a:spcPct val="100000"/>
+              </a:lnSpc>
+              <a:spcBef>
+                <a:spcPts val="0"/>
+              </a:spcBef>
+              <a:spcAft>
+                <a:spcPts val="0"/>
+              </a:spcAft>
+              <a:buClrTx/>
+              <a:buSzTx/>
+              <a:buFontTx/>
+              <a:buNone/>
+              <a:tabLst/>
+              <a:defRPr/>
+            </a:pPr>
+            <a:endParaRPr lang="pt-BR" sz="1800" b="1" dirty="0">
+              <a:effectLst/>
+              <a:latin typeface="RBLMI"/>
+            </a:endParaRPr>
+          </a:p>
+          <a:p>
+            <a:pPr marL="0" marR="0" lvl="0" indent="0" algn="l" defTabSz="914400" rtl="0" eaLnBrk="1" fontAlgn="auto" latinLnBrk="0" hangingPunct="1">
+              <a:lnSpc>
+                <a:spcPct val="100000"/>
+              </a:lnSpc>
+              <a:spcBef>
+                <a:spcPts val="0"/>
+              </a:spcBef>
+              <a:spcAft>
+                <a:spcPts val="0"/>
+              </a:spcAft>
+              <a:buClrTx/>
+              <a:buSzTx/>
+              <a:buFontTx/>
+              <a:buNone/>
+              <a:tabLst/>
+              <a:defRPr/>
+            </a:pPr>
+            <a:endParaRPr lang="el-GR" b="1" dirty="0"/>
+          </a:p>
+          <a:p>
+            <a:endParaRPr lang="pt-BR" dirty="0"/>
           </a:p>
         </p:txBody>
       </p:sp>
@@ -1945,26 +2277,7 @@
           <a:bodyPr/>
           <a:lstStyle/>
           <a:p>
-            <a:r>
-              <a:rPr lang="pt-BR" dirty="0"/>
-              <a:t>Os procedimentos </a:t>
-            </a:r>
-            <a:r>
-              <a:rPr lang="pt-BR" dirty="0" err="1"/>
-              <a:t>aglomerativos</a:t>
-            </a:r>
-            <a:r>
-              <a:rPr lang="pt-BR" dirty="0"/>
-              <a:t> começam com n clusters </a:t>
-            </a:r>
-            <a:r>
-              <a:rPr lang="pt-BR" dirty="0" err="1"/>
-              <a:t>singleton</a:t>
-            </a:r>
-            <a:r>
-              <a:rPr lang="pt-BR" dirty="0"/>
-              <a:t> e, em seguida, formam uma sequência mesclando clusters sucessivamente</a:t>
-            </a:r>
+            <a:endParaRPr lang="pt-BR" dirty="0"/>
           </a:p>
         </p:txBody>
       </p:sp>
@@ -2048,26 +2361,7 @@
           <a:bodyPr/>
           <a:lstStyle/>
           <a:p>
-            <a:r>
-              <a:rPr lang="pt-BR" dirty="0"/>
-              <a:t>Os procedimentos </a:t>
-            </a:r>
-            <a:r>
-              <a:rPr lang="pt-BR" dirty="0" err="1"/>
-              <a:t>aglomerativos</a:t>
-            </a:r>
-            <a:r>
-              <a:rPr lang="pt-BR" dirty="0"/>
-              <a:t> começam com n clusters </a:t>
-            </a:r>
-            <a:r>
-              <a:rPr lang="pt-BR" dirty="0" err="1"/>
-              <a:t>singleton</a:t>
-            </a:r>
-            <a:r>
-              <a:rPr lang="pt-BR" dirty="0"/>
-              <a:t> e, em seguida, formam uma sequência mesclando clusters sucessivamente</a:t>
-            </a:r>
+            <a:endParaRPr lang="pt-BR" dirty="0"/>
           </a:p>
         </p:txBody>
       </p:sp>
@@ -2151,26 +2445,7 @@
           <a:bodyPr/>
           <a:lstStyle/>
           <a:p>
-            <a:r>
-              <a:rPr lang="pt-BR" dirty="0"/>
-              <a:t>Os procedimentos </a:t>
-            </a:r>
-            <a:r>
-              <a:rPr lang="pt-BR" dirty="0" err="1"/>
-              <a:t>aglomerativos</a:t>
-            </a:r>
-            <a:r>
-              <a:rPr lang="pt-BR" dirty="0"/>
-              <a:t> começam com n clusters </a:t>
-            </a:r>
-            <a:r>
-              <a:rPr lang="pt-BR" dirty="0" err="1"/>
-              <a:t>singleton</a:t>
-            </a:r>
-            <a:r>
-              <a:rPr lang="pt-BR" dirty="0"/>
-              <a:t> e, em seguida, formam uma sequência mesclando clusters sucessivamente</a:t>
-            </a:r>
+            <a:endParaRPr lang="pt-BR" dirty="0"/>
           </a:p>
         </p:txBody>
       </p:sp>
@@ -2254,26 +2529,7 @@
           <a:bodyPr/>
           <a:lstStyle/>
           <a:p>
-            <a:r>
-              <a:rPr lang="pt-BR" dirty="0"/>
-              <a:t>Os procedimentos </a:t>
-            </a:r>
-            <a:r>
-              <a:rPr lang="pt-BR" dirty="0" err="1"/>
-              <a:t>aglomerativos</a:t>
-            </a:r>
-            <a:r>
-              <a:rPr lang="pt-BR" dirty="0"/>
-              <a:t> começam com n clusters </a:t>
-            </a:r>
-            <a:r>
-              <a:rPr lang="pt-BR" dirty="0" err="1"/>
-              <a:t>singleton</a:t>
-            </a:r>
-            <a:r>
-              <a:rPr lang="pt-BR" dirty="0"/>
-              <a:t> e, em seguida, formam uma sequência mesclando clusters sucessivamente</a:t>
-            </a:r>
+            <a:endParaRPr lang="pt-BR" dirty="0"/>
           </a:p>
         </p:txBody>
       </p:sp>
@@ -2357,26 +2613,7 @@
           <a:bodyPr/>
           <a:lstStyle/>
           <a:p>
-            <a:r>
-              <a:rPr lang="pt-BR" dirty="0"/>
-              <a:t>Os procedimentos </a:t>
-            </a:r>
-            <a:r>
-              <a:rPr lang="pt-BR" dirty="0" err="1"/>
-              <a:t>aglomerativos</a:t>
-            </a:r>
-            <a:r>
-              <a:rPr lang="pt-BR" dirty="0"/>
-              <a:t> começam com n clusters </a:t>
-            </a:r>
-            <a:r>
-              <a:rPr lang="pt-BR" dirty="0" err="1"/>
-              <a:t>singleton</a:t>
-            </a:r>
-            <a:r>
-              <a:rPr lang="pt-BR" dirty="0"/>
-              <a:t> e, em seguida, formam uma sequência mesclando clusters sucessivamente</a:t>
-            </a:r>
+            <a:endParaRPr lang="pt-BR" dirty="0"/>
           </a:p>
         </p:txBody>
       </p:sp>
@@ -2460,26 +2697,7 @@
           <a:bodyPr/>
           <a:lstStyle/>
           <a:p>
-            <a:r>
-              <a:rPr lang="pt-BR" dirty="0"/>
-              <a:t>Os procedimentos </a:t>
-            </a:r>
-            <a:r>
-              <a:rPr lang="pt-BR" dirty="0" err="1"/>
-              <a:t>aglomerativos</a:t>
-            </a:r>
-            <a:r>
-              <a:rPr lang="pt-BR" dirty="0"/>
-              <a:t> começam com n clusters </a:t>
-            </a:r>
-            <a:r>
-              <a:rPr lang="pt-BR" dirty="0" err="1"/>
-              <a:t>singleton</a:t>
-            </a:r>
-            <a:r>
-              <a:rPr lang="pt-BR" dirty="0"/>
-              <a:t> e, em seguida, formam uma sequência mesclando clusters sucessivamente</a:t>
-            </a:r>
+            <a:endParaRPr lang="pt-BR" dirty="0"/>
           </a:p>
         </p:txBody>
       </p:sp>
@@ -2510,6 +2728,90 @@
     <p:extLst>
       <p:ext uri="{BB962C8B-B14F-4D97-AF65-F5344CB8AC3E}">
         <p14:creationId xmlns:p14="http://schemas.microsoft.com/office/powerpoint/2010/main" val="3423768967"/>
+      </p:ext>
+    </p:extLst>
+  </p:cSld>
+  <p:clrMapOvr>
+    <a:masterClrMapping/>
+  </p:clrMapOvr>
+</p:notes>
+</file>
+
+<file path=ppt/notesSlides/notesSlide26.xml><?xml version="1.0" encoding="utf-8"?>
+<p:notes xmlns:a="http://schemas.openxmlformats.org/drawingml/2006/main" xmlns:r="http://schemas.openxmlformats.org/officeDocument/2006/relationships" xmlns:p="http://schemas.openxmlformats.org/presentationml/2006/main">
+  <p:cSld>
+    <p:spTree>
+      <p:nvGrpSpPr>
+        <p:cNvPr id="1" name=""/>
+        <p:cNvGrpSpPr/>
+        <p:nvPr/>
+      </p:nvGrpSpPr>
+      <p:grpSpPr>
+        <a:xfrm>
+          <a:off x="0" y="0"/>
+          <a:ext cx="0" cy="0"/>
+          <a:chOff x="0" y="0"/>
+          <a:chExt cx="0" cy="0"/>
+        </a:xfrm>
+      </p:grpSpPr>
+      <p:sp>
+        <p:nvSpPr>
+          <p:cNvPr id="2" name="Slide Image Placeholder 1"/>
+          <p:cNvSpPr>
+            <a:spLocks noGrp="1" noRot="1" noChangeAspect="1"/>
+          </p:cNvSpPr>
+          <p:nvPr>
+            <p:ph type="sldImg"/>
+          </p:nvPr>
+        </p:nvSpPr>
+        <p:spPr/>
+      </p:sp>
+      <p:sp>
+        <p:nvSpPr>
+          <p:cNvPr id="3" name="Notes Placeholder 2"/>
+          <p:cNvSpPr>
+            <a:spLocks noGrp="1"/>
+          </p:cNvSpPr>
+          <p:nvPr>
+            <p:ph type="body" idx="1"/>
+          </p:nvPr>
+        </p:nvSpPr>
+        <p:spPr/>
+        <p:txBody>
+          <a:bodyPr/>
+          <a:lstStyle/>
+          <a:p>
+            <a:endParaRPr lang="en-BR" dirty="0"/>
+          </a:p>
+        </p:txBody>
+      </p:sp>
+      <p:sp>
+        <p:nvSpPr>
+          <p:cNvPr id="4" name="Slide Number Placeholder 3"/>
+          <p:cNvSpPr>
+            <a:spLocks noGrp="1"/>
+          </p:cNvSpPr>
+          <p:nvPr>
+            <p:ph type="sldNum" sz="quarter" idx="5"/>
+          </p:nvPr>
+        </p:nvSpPr>
+        <p:spPr/>
+        <p:txBody>
+          <a:bodyPr/>
+          <a:lstStyle/>
+          <a:p>
+            <a:fld id="{1F8D2AEA-1C3E-4820-8402-A7907DA2F37E}" type="slidenum">
+              <a:rPr lang="pt-BR" smtClean="0"/>
+              <a:t>27</a:t>
+            </a:fld>
+            <a:endParaRPr lang="pt-BR"/>
+          </a:p>
+        </p:txBody>
+      </p:sp>
+    </p:spTree>
+    <p:extLst>
+      <p:ext uri="{BB962C8B-B14F-4D97-AF65-F5344CB8AC3E}">
+        <p14:creationId xmlns:p14="http://schemas.microsoft.com/office/powerpoint/2010/main" val="1241556798"/>
       </p:ext>
     </p:extLst>
   </p:cSld>
@@ -13703,7 +14005,7 @@
           <p:nvPr/>
         </p:nvPicPr>
         <p:blipFill>
-          <a:blip r:embed="rId2">
+          <a:blip r:embed="rId3">
             <a:extLst>
               <a:ext uri="{28A0092B-C50C-407E-A947-70E740481C1C}">
                 <a14:useLocalDpi xmlns:a14="http://schemas.microsoft.com/office/drawing/2010/main" val="0"/>
@@ -13750,7 +14052,7 @@
           <p:nvPr/>
         </p:nvPicPr>
         <p:blipFill rotWithShape="1">
-          <a:blip r:embed="rId3">
+          <a:blip r:embed="rId4">
             <a:extLst>
               <a:ext uri="{28A0092B-C50C-407E-A947-70E740481C1C}">
                 <a14:useLocalDpi xmlns:a14="http://schemas.microsoft.com/office/drawing/2010/main" val="0"/>
@@ -13851,7 +14153,7 @@
             </a:r>
             <a:r>
               <a:rPr lang="pt-BR" dirty="0">
-                <a:hlinkClick r:id="rId4"/>
+                <a:hlinkClick r:id="rId5"/>
               </a:rPr>
               <a:t>marciosr@ufu.br</a:t>
             </a:r>
@@ -13870,7 +14172,7 @@
             </a:r>
             <a:r>
               <a:rPr lang="pt-BR" dirty="0">
-                <a:hlinkClick r:id="rId5" tooltip="mailto:andrey.dias@ufu.br"/>
+                <a:hlinkClick r:id="rId6" tooltip="mailto:andrey.dias@ufu.br"/>
               </a:rPr>
               <a:t>andrey.dias@ufu.br</a:t>
             </a:r>
@@ -13889,7 +14191,7 @@
             </a:r>
             <a:r>
               <a:rPr lang="pt-BR" dirty="0">
-                <a:hlinkClick r:id="rId6" tooltip="mailto:pedrovictorgf@ufu.br"/>
+                <a:hlinkClick r:id="rId7" tooltip="mailto:pedrovictorgf@ufu.br"/>
               </a:rPr>
               <a:t>pedrovictorgf@ufu.br</a:t>
             </a:r>

</xml_diff>

<commit_message>
seminario: ajustando numeracao paginas slides
</commit_message>
<xml_diff>
--- a/Seminario/Optimal Clusters Final.pptx
+++ b/Seminario/Optimal Clusters Final.pptx
@@ -223,7 +223,7 @@
           <a:p>
             <a:fld id="{77F42454-F8E5-4448-9889-8156D3A2DC09}" type="datetimeFigureOut">
               <a:rPr lang="pt-BR" smtClean="0"/>
-              <a:t>30/05/2024</a:t>
+              <a:t>03/06/2024</a:t>
             </a:fld>
             <a:endParaRPr lang="pt-BR"/>
           </a:p>
@@ -3725,7 +3725,7 @@
           <a:p>
             <a:fld id="{8C15FD2E-C8FA-413F-967B-D393CA7492D4}" type="datetimeFigureOut">
               <a:rPr lang="pt-BR" smtClean="0"/>
-              <a:t>30/05/2024</a:t>
+              <a:t>03/06/2024</a:t>
             </a:fld>
             <a:endParaRPr lang="pt-BR"/>
           </a:p>
@@ -3923,7 +3923,7 @@
           <a:p>
             <a:fld id="{8C15FD2E-C8FA-413F-967B-D393CA7492D4}" type="datetimeFigureOut">
               <a:rPr lang="pt-BR" smtClean="0"/>
-              <a:t>30/05/2024</a:t>
+              <a:t>03/06/2024</a:t>
             </a:fld>
             <a:endParaRPr lang="pt-BR"/>
           </a:p>
@@ -4131,7 +4131,7 @@
           <a:p>
             <a:fld id="{8C15FD2E-C8FA-413F-967B-D393CA7492D4}" type="datetimeFigureOut">
               <a:rPr lang="pt-BR" smtClean="0"/>
-              <a:t>30/05/2024</a:t>
+              <a:t>03/06/2024</a:t>
             </a:fld>
             <a:endParaRPr lang="pt-BR"/>
           </a:p>
@@ -4329,7 +4329,7 @@
           <a:p>
             <a:fld id="{8C15FD2E-C8FA-413F-967B-D393CA7492D4}" type="datetimeFigureOut">
               <a:rPr lang="pt-BR" smtClean="0"/>
-              <a:t>30/05/2024</a:t>
+              <a:t>03/06/2024</a:t>
             </a:fld>
             <a:endParaRPr lang="pt-BR"/>
           </a:p>
@@ -4604,7 +4604,7 @@
           <a:p>
             <a:fld id="{8C15FD2E-C8FA-413F-967B-D393CA7492D4}" type="datetimeFigureOut">
               <a:rPr lang="pt-BR" smtClean="0"/>
-              <a:t>30/05/2024</a:t>
+              <a:t>03/06/2024</a:t>
             </a:fld>
             <a:endParaRPr lang="pt-BR"/>
           </a:p>
@@ -4869,7 +4869,7 @@
           <a:p>
             <a:fld id="{8C15FD2E-C8FA-413F-967B-D393CA7492D4}" type="datetimeFigureOut">
               <a:rPr lang="pt-BR" smtClean="0"/>
-              <a:t>30/05/2024</a:t>
+              <a:t>03/06/2024</a:t>
             </a:fld>
             <a:endParaRPr lang="pt-BR"/>
           </a:p>
@@ -5281,7 +5281,7 @@
           <a:p>
             <a:fld id="{8C15FD2E-C8FA-413F-967B-D393CA7492D4}" type="datetimeFigureOut">
               <a:rPr lang="pt-BR" smtClean="0"/>
-              <a:t>30/05/2024</a:t>
+              <a:t>03/06/2024</a:t>
             </a:fld>
             <a:endParaRPr lang="pt-BR"/>
           </a:p>
@@ -5422,7 +5422,7 @@
           <a:p>
             <a:fld id="{8C15FD2E-C8FA-413F-967B-D393CA7492D4}" type="datetimeFigureOut">
               <a:rPr lang="pt-BR" smtClean="0"/>
-              <a:t>30/05/2024</a:t>
+              <a:t>03/06/2024</a:t>
             </a:fld>
             <a:endParaRPr lang="pt-BR"/>
           </a:p>
@@ -5535,7 +5535,7 @@
           <a:p>
             <a:fld id="{8C15FD2E-C8FA-413F-967B-D393CA7492D4}" type="datetimeFigureOut">
               <a:rPr lang="pt-BR" smtClean="0"/>
-              <a:t>30/05/2024</a:t>
+              <a:t>03/06/2024</a:t>
             </a:fld>
             <a:endParaRPr lang="pt-BR"/>
           </a:p>
@@ -5846,7 +5846,7 @@
           <a:p>
             <a:fld id="{8C15FD2E-C8FA-413F-967B-D393CA7492D4}" type="datetimeFigureOut">
               <a:rPr lang="pt-BR" smtClean="0"/>
-              <a:t>30/05/2024</a:t>
+              <a:t>03/06/2024</a:t>
             </a:fld>
             <a:endParaRPr lang="pt-BR"/>
           </a:p>
@@ -6134,7 +6134,7 @@
           <a:p>
             <a:fld id="{8C15FD2E-C8FA-413F-967B-D393CA7492D4}" type="datetimeFigureOut">
               <a:rPr lang="pt-BR" smtClean="0"/>
-              <a:t>30/05/2024</a:t>
+              <a:t>03/06/2024</a:t>
             </a:fld>
             <a:endParaRPr lang="pt-BR"/>
           </a:p>
@@ -6375,7 +6375,7 @@
           <a:p>
             <a:fld id="{8C15FD2E-C8FA-413F-967B-D393CA7492D4}" type="datetimeFigureOut">
               <a:rPr lang="pt-BR" smtClean="0"/>
-              <a:t>30/05/2024</a:t>
+              <a:t>03/06/2024</a:t>
             </a:fld>
             <a:endParaRPr lang="pt-BR"/>
           </a:p>
@@ -7712,7 +7712,7 @@
                   <a:schemeClr val="tx1"/>
                 </a:solidFill>
               </a:rPr>
-              <a:t>9</a:t>
+              <a:t>10</a:t>
             </a:r>
           </a:p>
         </p:txBody>
@@ -8201,7 +8201,7 @@
                   <a:schemeClr val="tx1"/>
                 </a:solidFill>
               </a:rPr>
-              <a:t>10</a:t>
+              <a:t>11</a:t>
             </a:r>
           </a:p>
         </p:txBody>
@@ -8617,7 +8617,7 @@
                   <a:schemeClr val="tx1"/>
                 </a:solidFill>
               </a:rPr>
-              <a:t>11</a:t>
+              <a:t>12</a:t>
             </a:r>
           </a:p>
         </p:txBody>
@@ -9033,7 +9033,7 @@
                   <a:schemeClr val="tx1"/>
                 </a:solidFill>
               </a:rPr>
-              <a:t>12</a:t>
+              <a:t>13</a:t>
             </a:r>
           </a:p>
         </p:txBody>
@@ -9467,7 +9467,7 @@
                   <a:schemeClr val="tx1"/>
                 </a:solidFill>
               </a:rPr>
-              <a:t>13</a:t>
+              <a:t>14</a:t>
             </a:r>
           </a:p>
         </p:txBody>
@@ -9822,7 +9822,7 @@
                   <a:schemeClr val="tx1"/>
                 </a:solidFill>
               </a:rPr>
-              <a:t>14</a:t>
+              <a:t>15</a:t>
             </a:r>
           </a:p>
         </p:txBody>
@@ -10406,7 +10406,7 @@
                   <a:schemeClr val="tx1"/>
                 </a:solidFill>
               </a:rPr>
-              <a:t>15</a:t>
+              <a:t>16</a:t>
             </a:r>
           </a:p>
         </p:txBody>
@@ -10900,7 +10900,7 @@
                   <a:schemeClr val="tx1"/>
                 </a:solidFill>
               </a:rPr>
-              <a:t>16</a:t>
+              <a:t>17</a:t>
             </a:r>
           </a:p>
         </p:txBody>
@@ -11186,7 +11186,7 @@
                   <a:schemeClr val="tx1"/>
                 </a:solidFill>
               </a:rPr>
-              <a:t>17</a:t>
+              <a:t>18</a:t>
             </a:r>
           </a:p>
         </p:txBody>
@@ -11434,7 +11434,7 @@
                   <a:schemeClr val="tx1"/>
                 </a:solidFill>
               </a:rPr>
-              <a:t>18</a:t>
+              <a:t>19</a:t>
             </a:r>
           </a:p>
         </p:txBody>
@@ -12006,7 +12006,7 @@
                   <a:schemeClr val="tx1"/>
                 </a:solidFill>
               </a:rPr>
-              <a:t>19</a:t>
+              <a:t>20</a:t>
             </a:r>
           </a:p>
         </p:txBody>
@@ -12304,7 +12304,7 @@
                   <a:schemeClr val="tx1"/>
                 </a:solidFill>
               </a:rPr>
-              <a:t>20</a:t>
+              <a:t>21</a:t>
             </a:r>
           </a:p>
         </p:txBody>
@@ -12561,7 +12561,7 @@
                   <a:schemeClr val="tx1"/>
                 </a:solidFill>
               </a:rPr>
-              <a:t>21</a:t>
+              <a:t>22</a:t>
             </a:r>
           </a:p>
         </p:txBody>
@@ -12873,7 +12873,7 @@
                   <a:schemeClr val="tx1"/>
                 </a:solidFill>
               </a:rPr>
-              <a:t>22</a:t>
+              <a:t>23</a:t>
             </a:r>
           </a:p>
         </p:txBody>
@@ -13174,7 +13174,7 @@
                   <a:schemeClr val="tx1"/>
                 </a:solidFill>
               </a:rPr>
-              <a:t>23</a:t>
+              <a:t>24</a:t>
             </a:r>
           </a:p>
         </p:txBody>
@@ -13633,7 +13633,7 @@
                   <a:schemeClr val="tx1"/>
                 </a:solidFill>
               </a:rPr>
-              <a:t>24</a:t>
+              <a:t>25</a:t>
             </a:r>
           </a:p>
         </p:txBody>
@@ -13955,7 +13955,7 @@
                   <a:schemeClr val="tx1"/>
                 </a:solidFill>
               </a:rPr>
-              <a:t>25</a:t>
+              <a:t>26</a:t>
             </a:r>
           </a:p>
         </p:txBody>
@@ -14268,13 +14268,18 @@
           <a:p>
             <a:pPr algn="ctr"/>
             <a:r>
-              <a:rPr lang="pt-BR" sz="1200" dirty="0">
+              <a:rPr lang="pt-BR" sz="1200">
                 <a:solidFill>
                   <a:schemeClr val="tx1"/>
                 </a:solidFill>
               </a:rPr>
-              <a:t>26</a:t>
-            </a:r>
+              <a:t>27</a:t>
+            </a:r>
+            <a:endParaRPr lang="pt-BR" sz="1200" dirty="0">
+              <a:solidFill>
+                <a:schemeClr val="tx1"/>
+              </a:solidFill>
+            </a:endParaRPr>
           </a:p>
         </p:txBody>
       </p:sp>
@@ -14597,7 +14602,7 @@
                   <a:schemeClr val="tx1"/>
                 </a:solidFill>
               </a:rPr>
-              <a:t>2</a:t>
+              <a:t>3</a:t>
             </a:r>
           </a:p>
         </p:txBody>
@@ -14948,7 +14953,7 @@
                   <a:schemeClr val="tx1"/>
                 </a:solidFill>
               </a:rPr>
-              <a:t>3</a:t>
+              <a:t>4</a:t>
             </a:r>
           </a:p>
         </p:txBody>
@@ -15314,7 +15319,7 @@
                   <a:schemeClr val="tx1"/>
                 </a:solidFill>
               </a:rPr>
-              <a:t>4</a:t>
+              <a:t>5</a:t>
             </a:r>
           </a:p>
         </p:txBody>
@@ -15638,7 +15643,7 @@
                   <a:schemeClr val="tx1"/>
                 </a:solidFill>
               </a:rPr>
-              <a:t>5</a:t>
+              <a:t>6</a:t>
             </a:r>
           </a:p>
         </p:txBody>
@@ -15921,7 +15926,7 @@
                   <a:schemeClr val="tx1"/>
                 </a:solidFill>
               </a:rPr>
-              <a:t>5</a:t>
+              <a:t>7</a:t>
             </a:r>
           </a:p>
         </p:txBody>
@@ -16185,7 +16190,7 @@
                   <a:schemeClr val="tx1"/>
                 </a:solidFill>
               </a:rPr>
-              <a:t>7</a:t>
+              <a:t>8</a:t>
             </a:r>
           </a:p>
         </p:txBody>
@@ -16641,7 +16646,7 @@
                   <a:schemeClr val="tx1"/>
                 </a:solidFill>
               </a:rPr>
-              <a:t>8</a:t>
+              <a:t>9</a:t>
             </a:r>
           </a:p>
         </p:txBody>

</xml_diff>

<commit_message>
seminario: atualizando slide conclusao
</commit_message>
<xml_diff>
--- a/Seminario/Optimal Clusters Final.pptx
+++ b/Seminario/Optimal Clusters Final.pptx
@@ -223,7 +223,7 @@
           <a:p>
             <a:fld id="{77F42454-F8E5-4448-9889-8156D3A2DC09}" type="datetimeFigureOut">
               <a:rPr lang="pt-BR" smtClean="0"/>
-              <a:t>03/06/2024</a:t>
+              <a:t>04/06/2024</a:t>
             </a:fld>
             <a:endParaRPr lang="pt-BR"/>
           </a:p>
@@ -3725,7 +3725,7 @@
           <a:p>
             <a:fld id="{8C15FD2E-C8FA-413F-967B-D393CA7492D4}" type="datetimeFigureOut">
               <a:rPr lang="pt-BR" smtClean="0"/>
-              <a:t>03/06/2024</a:t>
+              <a:t>04/06/2024</a:t>
             </a:fld>
             <a:endParaRPr lang="pt-BR"/>
           </a:p>
@@ -3923,7 +3923,7 @@
           <a:p>
             <a:fld id="{8C15FD2E-C8FA-413F-967B-D393CA7492D4}" type="datetimeFigureOut">
               <a:rPr lang="pt-BR" smtClean="0"/>
-              <a:t>03/06/2024</a:t>
+              <a:t>04/06/2024</a:t>
             </a:fld>
             <a:endParaRPr lang="pt-BR"/>
           </a:p>
@@ -4131,7 +4131,7 @@
           <a:p>
             <a:fld id="{8C15FD2E-C8FA-413F-967B-D393CA7492D4}" type="datetimeFigureOut">
               <a:rPr lang="pt-BR" smtClean="0"/>
-              <a:t>03/06/2024</a:t>
+              <a:t>04/06/2024</a:t>
             </a:fld>
             <a:endParaRPr lang="pt-BR"/>
           </a:p>
@@ -4329,7 +4329,7 @@
           <a:p>
             <a:fld id="{8C15FD2E-C8FA-413F-967B-D393CA7492D4}" type="datetimeFigureOut">
               <a:rPr lang="pt-BR" smtClean="0"/>
-              <a:t>03/06/2024</a:t>
+              <a:t>04/06/2024</a:t>
             </a:fld>
             <a:endParaRPr lang="pt-BR"/>
           </a:p>
@@ -4604,7 +4604,7 @@
           <a:p>
             <a:fld id="{8C15FD2E-C8FA-413F-967B-D393CA7492D4}" type="datetimeFigureOut">
               <a:rPr lang="pt-BR" smtClean="0"/>
-              <a:t>03/06/2024</a:t>
+              <a:t>04/06/2024</a:t>
             </a:fld>
             <a:endParaRPr lang="pt-BR"/>
           </a:p>
@@ -4869,7 +4869,7 @@
           <a:p>
             <a:fld id="{8C15FD2E-C8FA-413F-967B-D393CA7492D4}" type="datetimeFigureOut">
               <a:rPr lang="pt-BR" smtClean="0"/>
-              <a:t>03/06/2024</a:t>
+              <a:t>04/06/2024</a:t>
             </a:fld>
             <a:endParaRPr lang="pt-BR"/>
           </a:p>
@@ -5281,7 +5281,7 @@
           <a:p>
             <a:fld id="{8C15FD2E-C8FA-413F-967B-D393CA7492D4}" type="datetimeFigureOut">
               <a:rPr lang="pt-BR" smtClean="0"/>
-              <a:t>03/06/2024</a:t>
+              <a:t>04/06/2024</a:t>
             </a:fld>
             <a:endParaRPr lang="pt-BR"/>
           </a:p>
@@ -5422,7 +5422,7 @@
           <a:p>
             <a:fld id="{8C15FD2E-C8FA-413F-967B-D393CA7492D4}" type="datetimeFigureOut">
               <a:rPr lang="pt-BR" smtClean="0"/>
-              <a:t>03/06/2024</a:t>
+              <a:t>04/06/2024</a:t>
             </a:fld>
             <a:endParaRPr lang="pt-BR"/>
           </a:p>
@@ -5535,7 +5535,7 @@
           <a:p>
             <a:fld id="{8C15FD2E-C8FA-413F-967B-D393CA7492D4}" type="datetimeFigureOut">
               <a:rPr lang="pt-BR" smtClean="0"/>
-              <a:t>03/06/2024</a:t>
+              <a:t>04/06/2024</a:t>
             </a:fld>
             <a:endParaRPr lang="pt-BR"/>
           </a:p>
@@ -5846,7 +5846,7 @@
           <a:p>
             <a:fld id="{8C15FD2E-C8FA-413F-967B-D393CA7492D4}" type="datetimeFigureOut">
               <a:rPr lang="pt-BR" smtClean="0"/>
-              <a:t>03/06/2024</a:t>
+              <a:t>04/06/2024</a:t>
             </a:fld>
             <a:endParaRPr lang="pt-BR"/>
           </a:p>
@@ -6134,7 +6134,7 @@
           <a:p>
             <a:fld id="{8C15FD2E-C8FA-413F-967B-D393CA7492D4}" type="datetimeFigureOut">
               <a:rPr lang="pt-BR" smtClean="0"/>
-              <a:t>03/06/2024</a:t>
+              <a:t>04/06/2024</a:t>
             </a:fld>
             <a:endParaRPr lang="pt-BR"/>
           </a:p>
@@ -6375,7 +6375,7 @@
           <a:p>
             <a:fld id="{8C15FD2E-C8FA-413F-967B-D393CA7492D4}" type="datetimeFigureOut">
               <a:rPr lang="pt-BR" smtClean="0"/>
-              <a:t>03/06/2024</a:t>
+              <a:t>04/06/2024</a:t>
             </a:fld>
             <a:endParaRPr lang="pt-BR"/>
           </a:p>
@@ -13727,21 +13727,37 @@
             <a:pPr algn="just"/>
             <a:r>
               <a:rPr lang="pt-BR" dirty="0"/>
-              <a:t>O algoritmo AHC consegue resultados estáveis de agrupamento</a:t>
+              <a:t>O algoritmo AHC com single </a:t>
+            </a:r>
+            <a:r>
+              <a:rPr lang="pt-BR" dirty="0" err="1"/>
+              <a:t>linkage</a:t>
+            </a:r>
+            <a:r>
+              <a:rPr lang="pt-BR" dirty="0"/>
+              <a:t> demonstrou resultados de agrupamento estáveis</a:t>
             </a:r>
           </a:p>
           <a:p>
             <a:pPr algn="just"/>
             <a:r>
               <a:rPr lang="pt-BR" dirty="0"/>
-              <a:t>O índice CSP aplicado no algoritmo ONCD apresentou acurácia superior aos demais índices apresentados</a:t>
+              <a:t>O índice CSP aplicado no algoritmo ONCD apresentou acurácia superior aos demais índices apresentados e são adequados para determinar o número ideal de agrupamentos para dados lineares, </a:t>
+            </a:r>
+            <a:r>
+              <a:rPr lang="pt-BR" dirty="0" err="1"/>
+              <a:t>manifold</a:t>
+            </a:r>
+            <a:r>
+              <a:rPr lang="pt-BR" dirty="0"/>
+              <a:t>, anulares e convexos.</a:t>
             </a:r>
           </a:p>
           <a:p>
             <a:pPr algn="just"/>
             <a:r>
               <a:rPr lang="pt-BR" dirty="0"/>
-              <a:t>O algoritmo ONCD é extensível à outros algoritmos de agrupamento (sendo necessário certo grau de otimização)</a:t>
+              <a:t>O algoritmo ONCD é extensível à outros algoritmos de agrupamento (sendo necessário certo grau de adaptação)</a:t>
             </a:r>
           </a:p>
         </p:txBody>
@@ -14268,18 +14284,13 @@
           <a:p>
             <a:pPr algn="ctr"/>
             <a:r>
-              <a:rPr lang="pt-BR" sz="1200">
+              <a:rPr lang="pt-BR" sz="1200" dirty="0">
                 <a:solidFill>
                   <a:schemeClr val="tx1"/>
                 </a:solidFill>
               </a:rPr>
               <a:t>27</a:t>
             </a:r>
-            <a:endParaRPr lang="pt-BR" sz="1200" dirty="0">
-              <a:solidFill>
-                <a:schemeClr val="tx1"/>
-              </a:solidFill>
-            </a:endParaRPr>
           </a:p>
         </p:txBody>
       </p:sp>

</xml_diff>